<commit_message>
edir word and pp
</commit_message>
<xml_diff>
--- a/FE03-Project Admin.pptx
+++ b/FE03-Project Admin.pptx
@@ -7,17 +7,18 @@
   <p:sldIdLst>
     <p:sldId id="256" r:id="rId2"/>
     <p:sldId id="258" r:id="rId3"/>
-    <p:sldId id="257" r:id="rId4"/>
-    <p:sldId id="259" r:id="rId5"/>
-    <p:sldId id="260" r:id="rId6"/>
-    <p:sldId id="268" r:id="rId7"/>
-    <p:sldId id="262" r:id="rId8"/>
-    <p:sldId id="261" r:id="rId9"/>
-    <p:sldId id="263" r:id="rId10"/>
-    <p:sldId id="264" r:id="rId11"/>
-    <p:sldId id="269" r:id="rId12"/>
-    <p:sldId id="265" r:id="rId13"/>
-    <p:sldId id="266" r:id="rId14"/>
+    <p:sldId id="271" r:id="rId4"/>
+    <p:sldId id="257" r:id="rId5"/>
+    <p:sldId id="259" r:id="rId6"/>
+    <p:sldId id="260" r:id="rId7"/>
+    <p:sldId id="268" r:id="rId8"/>
+    <p:sldId id="262" r:id="rId9"/>
+    <p:sldId id="261" r:id="rId10"/>
+    <p:sldId id="263" r:id="rId11"/>
+    <p:sldId id="264" r:id="rId12"/>
+    <p:sldId id="269" r:id="rId13"/>
+    <p:sldId id="265" r:id="rId14"/>
+    <p:sldId id="266" r:id="rId15"/>
   </p:sldIdLst>
   <p:sldSz cx="9144000" cy="6858000" type="screen4x3"/>
   <p:notesSz cx="6858000" cy="9144000"/>
@@ -3784,6 +3785,435 @@
           <a:chExt cx="0" cy="0"/>
         </a:xfrm>
       </p:grpSpPr>
+      <p:pic>
+        <p:nvPicPr>
+          <p:cNvPr id="5122" name="Picture 2"/>
+          <p:cNvPicPr>
+            <a:picLocks noChangeAspect="1" noChangeArrowheads="1"/>
+          </p:cNvPicPr>
+          <p:nvPr/>
+        </p:nvPicPr>
+        <p:blipFill>
+          <a:blip r:embed="rId2">
+            <a:extLst>
+              <a:ext uri="{28A0092B-C50C-407E-A947-70E740481C1C}">
+                <a14:useLocalDpi xmlns:a14="http://schemas.microsoft.com/office/drawing/2010/main" val="0"/>
+              </a:ext>
+            </a:extLst>
+          </a:blip>
+          <a:srcRect/>
+          <a:stretch>
+            <a:fillRect/>
+          </a:stretch>
+        </p:blipFill>
+        <p:spPr bwMode="auto">
+          <a:xfrm>
+            <a:off x="-152400" y="2147454"/>
+            <a:ext cx="9181624" cy="4471987"/>
+          </a:xfrm>
+          <a:prstGeom prst="rect">
+            <a:avLst/>
+          </a:prstGeom>
+          <a:noFill/>
+          <a:ln>
+            <a:noFill/>
+          </a:ln>
+          <a:effectLst/>
+          <a:extLst>
+            <a:ext uri="{909E8E84-426E-40DD-AFC4-6F175D3DCCD1}">
+              <a14:hiddenFill xmlns:a14="http://schemas.microsoft.com/office/drawing/2010/main">
+                <a:solidFill>
+                  <a:schemeClr val="accent1"/>
+                </a:solidFill>
+              </a14:hiddenFill>
+            </a:ext>
+            <a:ext uri="{91240B29-F687-4F45-9708-019B960494DF}">
+              <a14:hiddenLine xmlns:a14="http://schemas.microsoft.com/office/drawing/2010/main" w="9525">
+                <a:solidFill>
+                  <a:schemeClr val="tx1"/>
+                </a:solidFill>
+                <a:miter lim="800000"/>
+                <a:headEnd/>
+                <a:tailEnd/>
+              </a14:hiddenLine>
+            </a:ext>
+            <a:ext uri="{AF507438-7753-43E0-B8FC-AC1667EBCBE1}">
+              <a14:hiddenEffects xmlns:a14="http://schemas.microsoft.com/office/drawing/2010/main">
+                <a:effectLst>
+                  <a:outerShdw dist="35921" dir="2700000" algn="ctr" rotWithShape="0">
+                    <a:schemeClr val="bg2"/>
+                  </a:outerShdw>
+                </a:effectLst>
+              </a14:hiddenEffects>
+            </a:ext>
+          </a:extLst>
+        </p:spPr>
+      </p:pic>
+      <p:pic>
+        <p:nvPicPr>
+          <p:cNvPr id="5123" name="Picture 3"/>
+          <p:cNvPicPr>
+            <a:picLocks noChangeAspect="1" noChangeArrowheads="1"/>
+          </p:cNvPicPr>
+          <p:nvPr/>
+        </p:nvPicPr>
+        <p:blipFill>
+          <a:blip r:embed="rId3">
+            <a:extLst>
+              <a:ext uri="{28A0092B-C50C-407E-A947-70E740481C1C}">
+                <a14:useLocalDpi xmlns:a14="http://schemas.microsoft.com/office/drawing/2010/main" val="0"/>
+              </a:ext>
+            </a:extLst>
+          </a:blip>
+          <a:srcRect/>
+          <a:stretch>
+            <a:fillRect/>
+          </a:stretch>
+        </p:blipFill>
+        <p:spPr bwMode="auto">
+          <a:xfrm>
+            <a:off x="968519" y="1170709"/>
+            <a:ext cx="4486275" cy="990600"/>
+          </a:xfrm>
+          <a:prstGeom prst="rect">
+            <a:avLst/>
+          </a:prstGeom>
+          <a:noFill/>
+          <a:ln>
+            <a:noFill/>
+          </a:ln>
+          <a:effectLst/>
+          <a:extLst>
+            <a:ext uri="{909E8E84-426E-40DD-AFC4-6F175D3DCCD1}">
+              <a14:hiddenFill xmlns:a14="http://schemas.microsoft.com/office/drawing/2010/main">
+                <a:solidFill>
+                  <a:schemeClr val="accent1"/>
+                </a:solidFill>
+              </a14:hiddenFill>
+            </a:ext>
+            <a:ext uri="{91240B29-F687-4F45-9708-019B960494DF}">
+              <a14:hiddenLine xmlns:a14="http://schemas.microsoft.com/office/drawing/2010/main" w="9525">
+                <a:solidFill>
+                  <a:schemeClr val="tx1"/>
+                </a:solidFill>
+                <a:miter lim="800000"/>
+                <a:headEnd/>
+                <a:tailEnd/>
+              </a14:hiddenLine>
+            </a:ext>
+            <a:ext uri="{AF507438-7753-43E0-B8FC-AC1667EBCBE1}">
+              <a14:hiddenEffects xmlns:a14="http://schemas.microsoft.com/office/drawing/2010/main">
+                <a:effectLst>
+                  <a:outerShdw dist="35921" dir="2700000" algn="ctr" rotWithShape="0">
+                    <a:schemeClr val="bg2"/>
+                  </a:outerShdw>
+                </a:effectLst>
+              </a14:hiddenEffects>
+            </a:ext>
+          </a:extLst>
+        </p:spPr>
+      </p:pic>
+      <p:sp>
+        <p:nvSpPr>
+          <p:cNvPr id="4" name="TextBox 3"/>
+          <p:cNvSpPr txBox="1"/>
+          <p:nvPr/>
+        </p:nvSpPr>
+        <p:spPr>
+          <a:xfrm>
+            <a:off x="152400" y="512618"/>
+            <a:ext cx="9601200" cy="461665"/>
+          </a:xfrm>
+          <a:prstGeom prst="rect">
+            <a:avLst/>
+          </a:prstGeom>
+          <a:noFill/>
+        </p:spPr>
+        <p:txBody>
+          <a:bodyPr wrap="square" rtlCol="0">
+            <a:spAutoFit/>
+          </a:bodyPr>
+          <a:lstStyle/>
+          <a:p>
+            <a:r>
+              <a:rPr lang="en-US" sz="2400" dirty="0" err="1" smtClean="0"/>
+              <a:t>Quản</a:t>
+            </a:r>
+            <a:r>
+              <a:rPr lang="en-US" sz="2400" dirty="0" smtClean="0"/>
+              <a:t> </a:t>
+            </a:r>
+            <a:r>
+              <a:rPr lang="en-US" sz="2400" dirty="0" err="1" smtClean="0"/>
+              <a:t>lí</a:t>
+            </a:r>
+            <a:r>
+              <a:rPr lang="en-US" sz="2400" dirty="0" smtClean="0"/>
+              <a:t> </a:t>
+            </a:r>
+            <a:r>
+              <a:rPr lang="en-US" sz="2400" dirty="0" err="1" smtClean="0"/>
+              <a:t>đơn</a:t>
+            </a:r>
+            <a:r>
+              <a:rPr lang="en-US" sz="2400" dirty="0" smtClean="0"/>
+              <a:t> </a:t>
+            </a:r>
+            <a:r>
+              <a:rPr lang="en-US" sz="2400" dirty="0" err="1" smtClean="0"/>
+              <a:t>hàng</a:t>
+            </a:r>
+            <a:r>
+              <a:rPr lang="en-US" sz="2400" dirty="0" smtClean="0"/>
+              <a:t>, </a:t>
+            </a:r>
+            <a:r>
+              <a:rPr lang="en-US" sz="2400" dirty="0" err="1" smtClean="0"/>
+              <a:t>cho</a:t>
+            </a:r>
+            <a:r>
+              <a:rPr lang="en-US" sz="2400" dirty="0" smtClean="0"/>
+              <a:t> </a:t>
+            </a:r>
+            <a:r>
+              <a:rPr lang="en-US" sz="2400" dirty="0" err="1" smtClean="0"/>
+              <a:t>phép</a:t>
+            </a:r>
+            <a:r>
+              <a:rPr lang="en-US" sz="2400" dirty="0" smtClean="0"/>
+              <a:t> </a:t>
+            </a:r>
+            <a:r>
+              <a:rPr lang="en-US" sz="2400" dirty="0" err="1" smtClean="0"/>
+              <a:t>nhập</a:t>
+            </a:r>
+            <a:r>
+              <a:rPr lang="en-US" sz="2400" dirty="0" smtClean="0"/>
+              <a:t> </a:t>
+            </a:r>
+            <a:r>
+              <a:rPr lang="en-US" sz="2400" dirty="0" err="1" smtClean="0"/>
+              <a:t>sản</a:t>
+            </a:r>
+            <a:r>
+              <a:rPr lang="en-US" sz="2400" dirty="0" smtClean="0"/>
+              <a:t> </a:t>
+            </a:r>
+            <a:r>
+              <a:rPr lang="en-US" sz="2400" dirty="0" err="1" smtClean="0"/>
+              <a:t>phẩm</a:t>
+            </a:r>
+            <a:r>
+              <a:rPr lang="en-US" sz="2400" dirty="0" smtClean="0"/>
+              <a:t> </a:t>
+            </a:r>
+            <a:r>
+              <a:rPr lang="en-US" sz="2400" dirty="0" err="1" smtClean="0"/>
+              <a:t>vào</a:t>
+            </a:r>
+            <a:r>
+              <a:rPr lang="en-US" sz="2400" dirty="0" smtClean="0"/>
+              <a:t> </a:t>
+            </a:r>
+            <a:r>
+              <a:rPr lang="en-US" sz="2400" dirty="0" err="1" smtClean="0"/>
+              <a:t>khi</a:t>
+            </a:r>
+            <a:r>
+              <a:rPr lang="en-US" sz="2400" dirty="0" smtClean="0"/>
+              <a:t> </a:t>
+            </a:r>
+            <a:r>
+              <a:rPr lang="en-US" sz="2400" dirty="0" err="1" smtClean="0"/>
+              <a:t>có</a:t>
+            </a:r>
+            <a:r>
+              <a:rPr lang="en-US" sz="2400" dirty="0" smtClean="0"/>
+              <a:t> </a:t>
+            </a:r>
+            <a:r>
+              <a:rPr lang="en-US" sz="2400" dirty="0" err="1" smtClean="0"/>
+              <a:t>sản</a:t>
+            </a:r>
+            <a:r>
+              <a:rPr lang="en-US" sz="2400" dirty="0" smtClean="0"/>
+              <a:t> </a:t>
+            </a:r>
+            <a:r>
+              <a:rPr lang="en-US" sz="2400" dirty="0" err="1" smtClean="0"/>
+              <a:t>phẩm</a:t>
+            </a:r>
+            <a:r>
+              <a:rPr lang="en-US" sz="2400" dirty="0" smtClean="0"/>
+              <a:t> </a:t>
+            </a:r>
+            <a:r>
+              <a:rPr lang="en-US" sz="2400" dirty="0" err="1" smtClean="0"/>
+              <a:t>mới</a:t>
+            </a:r>
+            <a:endParaRPr lang="en-US" sz="2400" dirty="0"/>
+          </a:p>
+        </p:txBody>
+      </p:sp>
+    </p:spTree>
+    <p:extLst>
+      <p:ext uri="{BB962C8B-B14F-4D97-AF65-F5344CB8AC3E}">
+        <p14:creationId xmlns:p14="http://schemas.microsoft.com/office/powerpoint/2010/main" val="2779678098"/>
+      </p:ext>
+    </p:extLst>
+  </p:cSld>
+  <p:clrMapOvr>
+    <a:masterClrMapping/>
+  </p:clrMapOvr>
+  <p:timing>
+    <p:tnLst>
+      <p:par>
+        <p:cTn id="1" dur="indefinite" restart="never" nodeType="tmRoot">
+          <p:childTnLst>
+            <p:seq concurrent="1" nextAc="seek">
+              <p:cTn id="2" dur="indefinite" nodeType="mainSeq">
+                <p:childTnLst>
+                  <p:par>
+                    <p:cTn id="3" fill="hold">
+                      <p:stCondLst>
+                        <p:cond delay="indefinite"/>
+                      </p:stCondLst>
+                      <p:childTnLst>
+                        <p:par>
+                          <p:cTn id="4" fill="hold">
+                            <p:stCondLst>
+                              <p:cond delay="0"/>
+                            </p:stCondLst>
+                            <p:childTnLst>
+                              <p:par>
+                                <p:cTn id="5" presetID="42" presetClass="entr" presetSubtype="0" fill="hold" nodeType="clickEffect">
+                                  <p:stCondLst>
+                                    <p:cond delay="0"/>
+                                  </p:stCondLst>
+                                  <p:childTnLst>
+                                    <p:set>
+                                      <p:cBhvr>
+                                        <p:cTn id="6" dur="1" fill="hold">
+                                          <p:stCondLst>
+                                            <p:cond delay="0"/>
+                                          </p:stCondLst>
+                                        </p:cTn>
+                                        <p:tgtEl>
+                                          <p:spTgt spid="5123"/>
+                                        </p:tgtEl>
+                                        <p:attrNameLst>
+                                          <p:attrName>style.visibility</p:attrName>
+                                        </p:attrNameLst>
+                                      </p:cBhvr>
+                                      <p:to>
+                                        <p:strVal val="visible"/>
+                                      </p:to>
+                                    </p:set>
+                                    <p:animEffect transition="in" filter="fade">
+                                      <p:cBhvr>
+                                        <p:cTn id="7" dur="500"/>
+                                        <p:tgtEl>
+                                          <p:spTgt spid="5123"/>
+                                        </p:tgtEl>
+                                      </p:cBhvr>
+                                    </p:animEffect>
+                                    <p:anim calcmode="lin" valueType="num">
+                                      <p:cBhvr>
+                                        <p:cTn id="8" dur="500" fill="hold"/>
+                                        <p:tgtEl>
+                                          <p:spTgt spid="5123"/>
+                                        </p:tgtEl>
+                                        <p:attrNameLst>
+                                          <p:attrName>ppt_x</p:attrName>
+                                        </p:attrNameLst>
+                                      </p:cBhvr>
+                                      <p:tavLst>
+                                        <p:tav tm="0">
+                                          <p:val>
+                                            <p:strVal val="#ppt_x"/>
+                                          </p:val>
+                                        </p:tav>
+                                        <p:tav tm="100000">
+                                          <p:val>
+                                            <p:strVal val="#ppt_x"/>
+                                          </p:val>
+                                        </p:tav>
+                                      </p:tavLst>
+                                    </p:anim>
+                                    <p:anim calcmode="lin" valueType="num">
+                                      <p:cBhvr>
+                                        <p:cTn id="9" dur="500" fill="hold"/>
+                                        <p:tgtEl>
+                                          <p:spTgt spid="5123"/>
+                                        </p:tgtEl>
+                                        <p:attrNameLst>
+                                          <p:attrName>ppt_y</p:attrName>
+                                        </p:attrNameLst>
+                                      </p:cBhvr>
+                                      <p:tavLst>
+                                        <p:tav tm="0">
+                                          <p:val>
+                                            <p:strVal val="#ppt_y+.1"/>
+                                          </p:val>
+                                        </p:tav>
+                                        <p:tav tm="100000">
+                                          <p:val>
+                                            <p:strVal val="#ppt_y"/>
+                                          </p:val>
+                                        </p:tav>
+                                      </p:tavLst>
+                                    </p:anim>
+                                  </p:childTnLst>
+                                </p:cTn>
+                              </p:par>
+                            </p:childTnLst>
+                          </p:cTn>
+                        </p:par>
+                      </p:childTnLst>
+                    </p:cTn>
+                  </p:par>
+                </p:childTnLst>
+              </p:cTn>
+              <p:prevCondLst>
+                <p:cond evt="onPrev" delay="0">
+                  <p:tgtEl>
+                    <p:sldTgt/>
+                  </p:tgtEl>
+                </p:cond>
+              </p:prevCondLst>
+              <p:nextCondLst>
+                <p:cond evt="onNext" delay="0">
+                  <p:tgtEl>
+                    <p:sldTgt/>
+                  </p:tgtEl>
+                </p:cond>
+              </p:nextCondLst>
+            </p:seq>
+          </p:childTnLst>
+        </p:cTn>
+      </p:par>
+    </p:tnLst>
+  </p:timing>
+</p:sld>
+</file>
+
+<file path=ppt/slides/slide11.xml><?xml version="1.0" encoding="utf-8"?>
+<p:sld xmlns:a="http://schemas.openxmlformats.org/drawingml/2006/main" xmlns:r="http://schemas.openxmlformats.org/officeDocument/2006/relationships" xmlns:p="http://schemas.openxmlformats.org/presentationml/2006/main">
+  <p:cSld>
+    <p:spTree>
+      <p:nvGrpSpPr>
+        <p:cNvPr id="1" name=""/>
+        <p:cNvGrpSpPr/>
+        <p:nvPr/>
+      </p:nvGrpSpPr>
+      <p:grpSpPr>
+        <a:xfrm>
+          <a:off x="0" y="0"/>
+          <a:ext cx="0" cy="0"/>
+          <a:chOff x="0" y="0"/>
+          <a:chExt cx="0" cy="0"/>
+        </a:xfrm>
+      </p:grpSpPr>
       <p:sp>
         <p:nvSpPr>
           <p:cNvPr id="2" name="Title 1"/>
@@ -3973,7 +4403,7 @@
 </p:sld>
 </file>
 
-<file path=ppt/slides/slide11.xml><?xml version="1.0" encoding="utf-8"?>
+<file path=ppt/slides/slide12.xml><?xml version="1.0" encoding="utf-8"?>
 <p:sld xmlns:a="http://schemas.openxmlformats.org/drawingml/2006/main" xmlns:r="http://schemas.openxmlformats.org/officeDocument/2006/relationships" xmlns:p="http://schemas.openxmlformats.org/presentationml/2006/main">
   <p:cSld>
     <p:spTree>
@@ -4168,7 +4598,7 @@
 </p:sld>
 </file>
 
-<file path=ppt/slides/slide12.xml><?xml version="1.0" encoding="utf-8"?>
+<file path=ppt/slides/slide13.xml><?xml version="1.0" encoding="utf-8"?>
 <p:sld xmlns:a="http://schemas.openxmlformats.org/drawingml/2006/main" xmlns:r="http://schemas.openxmlformats.org/officeDocument/2006/relationships" xmlns:p="http://schemas.openxmlformats.org/presentationml/2006/main">
   <p:cSld>
     <p:spTree>
@@ -4777,7 +5207,7 @@
 </p:sld>
 </file>
 
-<file path=ppt/slides/slide13.xml><?xml version="1.0" encoding="utf-8"?>
+<file path=ppt/slides/slide14.xml><?xml version="1.0" encoding="utf-8"?>
 <p:sld xmlns:a="http://schemas.openxmlformats.org/drawingml/2006/main" xmlns:r="http://schemas.openxmlformats.org/officeDocument/2006/relationships" xmlns:p="http://schemas.openxmlformats.org/presentationml/2006/main">
   <p:cSld>
     <p:spTree>
@@ -5151,14 +5581,75 @@
       </p:grpSpPr>
       <p:sp>
         <p:nvSpPr>
-          <p:cNvPr id="4" name="TextBox 3"/>
+          <p:cNvPr id="4" name="Rectangle 3"/>
+          <p:cNvSpPr/>
+          <p:nvPr/>
+        </p:nvSpPr>
+        <p:spPr>
+          <a:xfrm>
+            <a:off x="685800" y="457199"/>
+            <a:ext cx="8153400" cy="584775"/>
+          </a:xfrm>
+          <a:prstGeom prst="rect">
+            <a:avLst/>
+          </a:prstGeom>
+        </p:spPr>
+        <p:txBody>
+          <a:bodyPr wrap="square">
+            <a:spAutoFit/>
+          </a:bodyPr>
+          <a:lstStyle/>
+          <a:p>
+            <a:r>
+              <a:rPr lang="en-US" sz="3200" u="sng" dirty="0"/>
+              <a:t>1. </a:t>
+            </a:r>
+            <a:r>
+              <a:rPr lang="en-US" sz="3200" u="sng" dirty="0" err="1"/>
+              <a:t>Giới</a:t>
+            </a:r>
+            <a:r>
+              <a:rPr lang="en-US" sz="3200" u="sng" dirty="0"/>
+              <a:t> </a:t>
+            </a:r>
+            <a:r>
+              <a:rPr lang="en-US" sz="3200" u="sng" dirty="0" err="1"/>
+              <a:t>thiệu</a:t>
+            </a:r>
+            <a:r>
+              <a:rPr lang="en-US" sz="3200" u="sng" dirty="0"/>
+              <a:t> </a:t>
+            </a:r>
+            <a:r>
+              <a:rPr lang="en-US" sz="3200" u="sng" dirty="0" err="1"/>
+              <a:t>dự</a:t>
+            </a:r>
+            <a:r>
+              <a:rPr lang="en-US" sz="3200" u="sng" dirty="0"/>
+              <a:t> </a:t>
+            </a:r>
+            <a:r>
+              <a:rPr lang="en-US" sz="3200" u="sng" dirty="0" err="1" smtClean="0"/>
+              <a:t>án</a:t>
+            </a:r>
+            <a:r>
+              <a:rPr lang="en-US" sz="3200" u="sng" dirty="0" smtClean="0"/>
+              <a:t>:</a:t>
+            </a:r>
+            <a:endParaRPr lang="en-US" sz="3200" u="sng" dirty="0"/>
+          </a:p>
+        </p:txBody>
+      </p:sp>
+      <p:sp>
+        <p:nvSpPr>
+          <p:cNvPr id="6" name="TextBox 5"/>
           <p:cNvSpPr txBox="1"/>
           <p:nvPr/>
         </p:nvSpPr>
         <p:spPr>
           <a:xfrm>
-            <a:off x="533400" y="533400"/>
-            <a:ext cx="6705600" cy="523220"/>
+            <a:off x="706582" y="1274618"/>
+            <a:ext cx="8153400" cy="1569660"/>
           </a:xfrm>
           <a:prstGeom prst="rect">
             <a:avLst/>
@@ -5172,45 +5663,1013 @@
           <a:lstStyle/>
           <a:p>
             <a:r>
-              <a:rPr lang="en-US" sz="2800" u="sng" dirty="0" smtClean="0"/>
-              <a:t>1. </a:t>
-            </a:r>
-            <a:r>
-              <a:rPr lang="en-US" sz="2800" u="sng" dirty="0" err="1" smtClean="0"/>
-              <a:t>Giới</a:t>
-            </a:r>
-            <a:r>
-              <a:rPr lang="en-US" sz="2800" u="sng" dirty="0" smtClean="0"/>
-              <a:t> </a:t>
-            </a:r>
-            <a:r>
-              <a:rPr lang="en-US" sz="2800" u="sng" dirty="0" err="1" smtClean="0"/>
-              <a:t>thiệu</a:t>
-            </a:r>
-            <a:r>
-              <a:rPr lang="en-US" sz="2800" u="sng" dirty="0" smtClean="0"/>
-              <a:t> </a:t>
-            </a:r>
-            <a:r>
-              <a:rPr lang="en-US" sz="2800" u="sng" dirty="0" err="1" smtClean="0"/>
-              <a:t>dự</a:t>
-            </a:r>
-            <a:r>
-              <a:rPr lang="en-US" sz="2800" u="sng" dirty="0" smtClean="0"/>
-              <a:t> </a:t>
-            </a:r>
-            <a:r>
-              <a:rPr lang="en-US" sz="2800" u="sng" dirty="0" err="1" smtClean="0"/>
-              <a:t>án</a:t>
-            </a:r>
-            <a:r>
-              <a:rPr lang="en-US" sz="2800" u="sng" dirty="0" smtClean="0"/>
-              <a:t>:</a:t>
-            </a:r>
-            <a:endParaRPr lang="en-US" sz="2800" u="sng" dirty="0"/>
-          </a:p>
-        </p:txBody>
-      </p:sp>
+              <a:rPr lang="en-GB" sz="2400" dirty="0" smtClean="0"/>
+              <a:t>- </a:t>
+            </a:r>
+            <a:r>
+              <a:rPr lang="en-GB" sz="2400" dirty="0" err="1" smtClean="0"/>
+              <a:t>Với</a:t>
+            </a:r>
+            <a:r>
+              <a:rPr lang="en-GB" sz="2400" dirty="0" smtClean="0"/>
+              <a:t> </a:t>
+            </a:r>
+            <a:r>
+              <a:rPr lang="en-GB" sz="2400" dirty="0" err="1" smtClean="0"/>
+              <a:t>sự</a:t>
+            </a:r>
+            <a:r>
+              <a:rPr lang="en-GB" sz="2400" dirty="0" smtClean="0"/>
+              <a:t> </a:t>
+            </a:r>
+            <a:r>
+              <a:rPr lang="en-GB" sz="2400" dirty="0" err="1"/>
+              <a:t>phát</a:t>
+            </a:r>
+            <a:r>
+              <a:rPr lang="en-GB" sz="2400" dirty="0"/>
+              <a:t> </a:t>
+            </a:r>
+            <a:r>
+              <a:rPr lang="en-GB" sz="2400" dirty="0" err="1"/>
+              <a:t>triển</a:t>
+            </a:r>
+            <a:r>
+              <a:rPr lang="en-GB" sz="2400" dirty="0"/>
+              <a:t> </a:t>
+            </a:r>
+            <a:r>
+              <a:rPr lang="en-GB" sz="2400" dirty="0" err="1"/>
+              <a:t>mạnh</a:t>
+            </a:r>
+            <a:r>
+              <a:rPr lang="en-GB" sz="2400" dirty="0"/>
+              <a:t> </a:t>
+            </a:r>
+            <a:r>
+              <a:rPr lang="en-GB" sz="2400" dirty="0" err="1"/>
+              <a:t>mẽ</a:t>
+            </a:r>
+            <a:r>
+              <a:rPr lang="en-GB" sz="2400" dirty="0"/>
+              <a:t> </a:t>
+            </a:r>
+            <a:r>
+              <a:rPr lang="en-GB" sz="2400" dirty="0" err="1"/>
+              <a:t>của</a:t>
+            </a:r>
+            <a:r>
+              <a:rPr lang="en-GB" sz="2400" dirty="0"/>
+              <a:t> </a:t>
+            </a:r>
+            <a:r>
+              <a:rPr lang="en-GB" sz="2400" dirty="0" err="1"/>
+              <a:t>thương</a:t>
+            </a:r>
+            <a:r>
+              <a:rPr lang="en-GB" sz="2400" dirty="0"/>
+              <a:t> </a:t>
+            </a:r>
+            <a:r>
+              <a:rPr lang="en-GB" sz="2400" dirty="0" err="1"/>
+              <a:t>mai</a:t>
+            </a:r>
+            <a:r>
+              <a:rPr lang="en-GB" sz="2400" dirty="0"/>
+              <a:t> </a:t>
+            </a:r>
+            <a:r>
+              <a:rPr lang="en-GB" sz="2400" dirty="0" err="1"/>
+              <a:t>điện</a:t>
+            </a:r>
+            <a:r>
+              <a:rPr lang="en-GB" sz="2400" dirty="0"/>
+              <a:t> </a:t>
+            </a:r>
+            <a:r>
+              <a:rPr lang="en-GB" sz="2400" dirty="0" err="1"/>
+              <a:t>tử</a:t>
+            </a:r>
+            <a:r>
+              <a:rPr lang="en-GB" sz="2400" dirty="0"/>
+              <a:t> </a:t>
+            </a:r>
+            <a:r>
+              <a:rPr lang="en-GB" sz="2400" dirty="0" err="1"/>
+              <a:t>như</a:t>
+            </a:r>
+            <a:r>
+              <a:rPr lang="en-GB" sz="2400" dirty="0"/>
+              <a:t> </a:t>
+            </a:r>
+            <a:r>
+              <a:rPr lang="en-GB" sz="2400" dirty="0" err="1"/>
+              <a:t>hiện</a:t>
+            </a:r>
+            <a:r>
+              <a:rPr lang="en-GB" sz="2400" dirty="0"/>
+              <a:t> nay </a:t>
+            </a:r>
+            <a:r>
+              <a:rPr lang="en-GB" sz="2400" dirty="0" err="1"/>
+              <a:t>cùng</a:t>
+            </a:r>
+            <a:r>
+              <a:rPr lang="en-GB" sz="2400" dirty="0"/>
+              <a:t> </a:t>
+            </a:r>
+            <a:r>
+              <a:rPr lang="en-GB" sz="2400" dirty="0" err="1"/>
+              <a:t>với</a:t>
+            </a:r>
+            <a:r>
+              <a:rPr lang="en-GB" sz="2400" dirty="0"/>
+              <a:t> </a:t>
+            </a:r>
+            <a:r>
+              <a:rPr lang="en-GB" sz="2400" dirty="0" err="1"/>
+              <a:t>sự</a:t>
+            </a:r>
+            <a:r>
+              <a:rPr lang="en-GB" sz="2400" dirty="0"/>
+              <a:t> </a:t>
+            </a:r>
+            <a:r>
+              <a:rPr lang="en-GB" sz="2400" dirty="0" err="1"/>
+              <a:t>bùng</a:t>
+            </a:r>
+            <a:r>
+              <a:rPr lang="en-GB" sz="2400" dirty="0"/>
+              <a:t> </a:t>
+            </a:r>
+            <a:r>
+              <a:rPr lang="en-GB" sz="2400" dirty="0" err="1"/>
+              <a:t>nổ</a:t>
+            </a:r>
+            <a:r>
+              <a:rPr lang="en-GB" sz="2400" dirty="0"/>
+              <a:t> </a:t>
+            </a:r>
+            <a:r>
+              <a:rPr lang="en-GB" sz="2400" dirty="0" err="1"/>
+              <a:t>của</a:t>
+            </a:r>
+            <a:r>
+              <a:rPr lang="en-GB" sz="2400" dirty="0"/>
+              <a:t> </a:t>
+            </a:r>
+            <a:r>
+              <a:rPr lang="en-GB" sz="2400" dirty="0" smtClean="0"/>
+              <a:t>Internet, </a:t>
+            </a:r>
+            <a:r>
+              <a:rPr lang="en-GB" sz="2400" dirty="0" err="1" smtClean="0"/>
+              <a:t>việc</a:t>
+            </a:r>
+            <a:r>
+              <a:rPr lang="en-GB" sz="2400" dirty="0" smtClean="0"/>
+              <a:t> </a:t>
+            </a:r>
+            <a:r>
+              <a:rPr lang="en-GB" sz="2400" dirty="0" err="1"/>
+              <a:t>lựa</a:t>
+            </a:r>
+            <a:r>
+              <a:rPr lang="en-GB" sz="2400" dirty="0"/>
+              <a:t> </a:t>
+            </a:r>
+            <a:r>
+              <a:rPr lang="en-GB" sz="2400" dirty="0" err="1"/>
+              <a:t>chọn</a:t>
+            </a:r>
+            <a:r>
+              <a:rPr lang="en-GB" sz="2400" dirty="0"/>
+              <a:t> </a:t>
+            </a:r>
+            <a:r>
+              <a:rPr lang="en-GB" sz="2400" dirty="0" err="1"/>
+              <a:t>phương</a:t>
+            </a:r>
+            <a:r>
+              <a:rPr lang="en-GB" sz="2400" dirty="0"/>
+              <a:t> </a:t>
+            </a:r>
+            <a:r>
+              <a:rPr lang="en-GB" sz="2400" dirty="0" err="1"/>
+              <a:t>pháp</a:t>
+            </a:r>
+            <a:r>
+              <a:rPr lang="en-GB" sz="2400" dirty="0"/>
+              <a:t> </a:t>
+            </a:r>
+            <a:r>
+              <a:rPr lang="en-GB" sz="2400" dirty="0" err="1"/>
+              <a:t>kinh</a:t>
+            </a:r>
+            <a:r>
+              <a:rPr lang="en-GB" sz="2400" dirty="0"/>
+              <a:t> </a:t>
+            </a:r>
+            <a:r>
+              <a:rPr lang="en-GB" sz="2400" dirty="0" err="1"/>
+              <a:t>doanh</a:t>
+            </a:r>
+            <a:r>
+              <a:rPr lang="en-GB" sz="2400" dirty="0"/>
+              <a:t> </a:t>
+            </a:r>
+            <a:r>
+              <a:rPr lang="en-GB" sz="2400" dirty="0" err="1"/>
+              <a:t>trên</a:t>
+            </a:r>
+            <a:r>
+              <a:rPr lang="en-GB" sz="2400" dirty="0"/>
+              <a:t> Internet </a:t>
+            </a:r>
+            <a:r>
+              <a:rPr lang="en-GB" sz="2400" dirty="0" err="1"/>
+              <a:t>là</a:t>
+            </a:r>
+            <a:r>
+              <a:rPr lang="en-GB" sz="2400" dirty="0"/>
+              <a:t> </a:t>
+            </a:r>
+            <a:r>
+              <a:rPr lang="en-GB" sz="2400" dirty="0" err="1"/>
+              <a:t>một</a:t>
+            </a:r>
+            <a:r>
+              <a:rPr lang="en-GB" sz="2400" dirty="0"/>
+              <a:t> </a:t>
+            </a:r>
+            <a:r>
+              <a:rPr lang="en-GB" sz="2400" dirty="0" err="1"/>
+              <a:t>giải</a:t>
+            </a:r>
+            <a:r>
+              <a:rPr lang="en-GB" sz="2400" dirty="0"/>
+              <a:t> </a:t>
+            </a:r>
+            <a:r>
+              <a:rPr lang="en-GB" sz="2400" dirty="0" err="1"/>
+              <a:t>pháp</a:t>
+            </a:r>
+            <a:r>
+              <a:rPr lang="en-GB" sz="2400" dirty="0"/>
+              <a:t> </a:t>
+            </a:r>
+            <a:r>
+              <a:rPr lang="en-GB" sz="2400" dirty="0" err="1"/>
+              <a:t>khá</a:t>
+            </a:r>
+            <a:r>
+              <a:rPr lang="en-GB" sz="2400" dirty="0"/>
+              <a:t> </a:t>
+            </a:r>
+            <a:r>
+              <a:rPr lang="en-GB" sz="2400" dirty="0" err="1"/>
+              <a:t>tối</a:t>
+            </a:r>
+            <a:r>
+              <a:rPr lang="en-GB" sz="2400" dirty="0"/>
+              <a:t> </a:t>
+            </a:r>
+            <a:r>
+              <a:rPr lang="en-GB" sz="2400" dirty="0" err="1"/>
+              <a:t>ưu</a:t>
+            </a:r>
+            <a:r>
+              <a:rPr lang="en-GB" sz="2400" dirty="0"/>
+              <a:t> </a:t>
+            </a:r>
+            <a:r>
+              <a:rPr lang="en-GB" sz="2400" dirty="0" err="1"/>
+              <a:t>và</a:t>
+            </a:r>
+            <a:r>
+              <a:rPr lang="en-GB" sz="2400" dirty="0"/>
+              <a:t> </a:t>
+            </a:r>
+            <a:r>
+              <a:rPr lang="en-GB" sz="2400" dirty="0" err="1"/>
+              <a:t>tiết</a:t>
+            </a:r>
+            <a:r>
+              <a:rPr lang="en-GB" sz="2400" dirty="0"/>
+              <a:t> </a:t>
+            </a:r>
+            <a:r>
+              <a:rPr lang="en-GB" sz="2400" dirty="0" err="1"/>
+              <a:t>kiệm</a:t>
+            </a:r>
+            <a:r>
+              <a:rPr lang="en-GB" sz="2400" dirty="0"/>
+              <a:t> </a:t>
+            </a:r>
+            <a:r>
+              <a:rPr lang="en-GB" sz="2400" dirty="0" err="1"/>
+              <a:t>cho</a:t>
+            </a:r>
+            <a:r>
+              <a:rPr lang="en-GB" sz="2400" dirty="0"/>
+              <a:t> </a:t>
+            </a:r>
+            <a:r>
+              <a:rPr lang="en-GB" sz="2400" dirty="0" err="1"/>
+              <a:t>các</a:t>
+            </a:r>
+            <a:r>
+              <a:rPr lang="en-GB" sz="2400" dirty="0"/>
+              <a:t> </a:t>
+            </a:r>
+            <a:r>
+              <a:rPr lang="en-GB" sz="2400" dirty="0" err="1"/>
+              <a:t>doanh</a:t>
+            </a:r>
+            <a:r>
+              <a:rPr lang="en-GB" sz="2400" dirty="0"/>
+              <a:t> </a:t>
+            </a:r>
+            <a:r>
+              <a:rPr lang="en-GB" sz="2400" dirty="0" err="1"/>
+              <a:t>nghiệp</a:t>
+            </a:r>
+            <a:endParaRPr lang="en-US" sz="2400" dirty="0"/>
+          </a:p>
+        </p:txBody>
+      </p:sp>
+      <p:sp>
+        <p:nvSpPr>
+          <p:cNvPr id="7" name="TextBox 6"/>
+          <p:cNvSpPr txBox="1"/>
+          <p:nvPr/>
+        </p:nvSpPr>
+        <p:spPr>
+          <a:xfrm>
+            <a:off x="685800" y="3124200"/>
+            <a:ext cx="8153400" cy="1631216"/>
+          </a:xfrm>
+          <a:prstGeom prst="rect">
+            <a:avLst/>
+          </a:prstGeom>
+          <a:noFill/>
+        </p:spPr>
+        <p:txBody>
+          <a:bodyPr wrap="square" rtlCol="0">
+            <a:spAutoFit/>
+          </a:bodyPr>
+          <a:lstStyle/>
+          <a:p>
+            <a:r>
+              <a:rPr lang="en-GB" sz="2400" dirty="0" smtClean="0"/>
+              <a:t>- </a:t>
+            </a:r>
+            <a:r>
+              <a:rPr lang="en-GB" sz="2400" dirty="0" err="1" smtClean="0"/>
+              <a:t>Để</a:t>
+            </a:r>
+            <a:r>
+              <a:rPr lang="en-GB" sz="2400" dirty="0" smtClean="0"/>
+              <a:t> </a:t>
+            </a:r>
+            <a:r>
+              <a:rPr lang="en-GB" sz="2400" dirty="0" err="1"/>
+              <a:t>có</a:t>
+            </a:r>
+            <a:r>
+              <a:rPr lang="en-GB" sz="2400" dirty="0"/>
+              <a:t> </a:t>
+            </a:r>
+            <a:r>
+              <a:rPr lang="en-GB" sz="2400" dirty="0" err="1"/>
+              <a:t>thể</a:t>
+            </a:r>
+            <a:r>
+              <a:rPr lang="en-GB" sz="2400" dirty="0"/>
+              <a:t> </a:t>
+            </a:r>
+            <a:r>
+              <a:rPr lang="en-GB" sz="2400" dirty="0" err="1"/>
+              <a:t>bắt</a:t>
+            </a:r>
+            <a:r>
+              <a:rPr lang="en-GB" sz="2400" dirty="0"/>
+              <a:t> </a:t>
+            </a:r>
+            <a:r>
+              <a:rPr lang="en-GB" sz="2400" dirty="0" err="1"/>
+              <a:t>đầu</a:t>
+            </a:r>
+            <a:r>
+              <a:rPr lang="en-GB" sz="2400" dirty="0"/>
+              <a:t> </a:t>
+            </a:r>
+            <a:r>
+              <a:rPr lang="en-GB" sz="2400" dirty="0" err="1"/>
+              <a:t>kinh</a:t>
+            </a:r>
+            <a:r>
+              <a:rPr lang="en-GB" sz="2400" dirty="0"/>
+              <a:t> </a:t>
+            </a:r>
+            <a:r>
+              <a:rPr lang="en-GB" sz="2400" dirty="0" err="1"/>
+              <a:t>doanh</a:t>
+            </a:r>
+            <a:r>
+              <a:rPr lang="en-GB" sz="2400" dirty="0"/>
+              <a:t> </a:t>
+            </a:r>
+            <a:r>
+              <a:rPr lang="en-GB" sz="2400" dirty="0" err="1"/>
+              <a:t>tốt</a:t>
+            </a:r>
+            <a:r>
+              <a:rPr lang="en-GB" sz="2400" dirty="0"/>
+              <a:t> </a:t>
+            </a:r>
+            <a:r>
+              <a:rPr lang="en-GB" sz="2400" dirty="0" err="1"/>
+              <a:t>một</a:t>
+            </a:r>
+            <a:r>
+              <a:rPr lang="en-GB" sz="2400" dirty="0"/>
+              <a:t> </a:t>
+            </a:r>
+            <a:r>
+              <a:rPr lang="en-GB" sz="2400" dirty="0" err="1"/>
+              <a:t>mặt</a:t>
+            </a:r>
+            <a:r>
+              <a:rPr lang="en-GB" sz="2400" dirty="0"/>
+              <a:t> </a:t>
+            </a:r>
+            <a:r>
+              <a:rPr lang="en-GB" sz="2400" dirty="0" err="1"/>
+              <a:t>hàng</a:t>
+            </a:r>
+            <a:r>
+              <a:rPr lang="en-GB" sz="2400" dirty="0"/>
+              <a:t> </a:t>
+            </a:r>
+            <a:r>
+              <a:rPr lang="en-GB" sz="2400" dirty="0" err="1"/>
+              <a:t>nào</a:t>
+            </a:r>
+            <a:r>
+              <a:rPr lang="en-GB" sz="2400" dirty="0"/>
+              <a:t> </a:t>
+            </a:r>
+            <a:r>
+              <a:rPr lang="en-GB" sz="2400" dirty="0" err="1"/>
+              <a:t>đó</a:t>
+            </a:r>
+            <a:r>
+              <a:rPr lang="en-GB" sz="2400" dirty="0"/>
+              <a:t> </a:t>
+            </a:r>
+            <a:r>
+              <a:rPr lang="en-GB" sz="2400" dirty="0" err="1"/>
+              <a:t>trên</a:t>
+            </a:r>
+            <a:r>
+              <a:rPr lang="en-GB" sz="2400" dirty="0"/>
+              <a:t> </a:t>
+            </a:r>
+            <a:r>
+              <a:rPr lang="en-GB" sz="2400" dirty="0" err="1"/>
+              <a:t>Internet,chúng</a:t>
+            </a:r>
+            <a:r>
+              <a:rPr lang="en-GB" sz="2400" dirty="0"/>
+              <a:t> ta </a:t>
+            </a:r>
+            <a:r>
+              <a:rPr lang="en-GB" sz="2400" dirty="0" err="1"/>
+              <a:t>phải</a:t>
+            </a:r>
+            <a:r>
+              <a:rPr lang="en-GB" sz="2400" dirty="0"/>
+              <a:t> </a:t>
+            </a:r>
+            <a:r>
+              <a:rPr lang="en-GB" sz="2400" dirty="0" err="1"/>
+              <a:t>có</a:t>
+            </a:r>
+            <a:r>
+              <a:rPr lang="en-GB" sz="2400" dirty="0"/>
+              <a:t> </a:t>
+            </a:r>
+            <a:r>
+              <a:rPr lang="en-GB" sz="2400" dirty="0" err="1"/>
+              <a:t>một</a:t>
+            </a:r>
+            <a:r>
+              <a:rPr lang="en-GB" sz="2400" dirty="0"/>
+              <a:t> website </a:t>
+            </a:r>
+            <a:r>
+              <a:rPr lang="en-GB" sz="2400" dirty="0" err="1"/>
+              <a:t>bán</a:t>
+            </a:r>
+            <a:r>
+              <a:rPr lang="en-GB" sz="2400" dirty="0"/>
+              <a:t> </a:t>
+            </a:r>
+            <a:r>
+              <a:rPr lang="en-GB" sz="2400" dirty="0" err="1"/>
+              <a:t>hàng</a:t>
+            </a:r>
+            <a:r>
+              <a:rPr lang="en-GB" sz="2400" dirty="0"/>
+              <a:t> </a:t>
+            </a:r>
+            <a:r>
+              <a:rPr lang="en-GB" sz="2400" dirty="0" err="1"/>
+              <a:t>đầy</a:t>
+            </a:r>
+            <a:r>
+              <a:rPr lang="en-GB" sz="2400" dirty="0"/>
+              <a:t> </a:t>
+            </a:r>
+            <a:r>
+              <a:rPr lang="en-GB" sz="2400" dirty="0" err="1"/>
+              <a:t>đủ</a:t>
+            </a:r>
+            <a:r>
+              <a:rPr lang="en-GB" sz="2400" dirty="0"/>
+              <a:t> </a:t>
+            </a:r>
+            <a:r>
+              <a:rPr lang="en-GB" sz="2400" dirty="0" err="1"/>
+              <a:t>các</a:t>
+            </a:r>
+            <a:r>
+              <a:rPr lang="en-GB" sz="2400" dirty="0"/>
+              <a:t> </a:t>
+            </a:r>
+            <a:r>
+              <a:rPr lang="en-GB" sz="2400" dirty="0" err="1"/>
+              <a:t>tính</a:t>
+            </a:r>
+            <a:r>
+              <a:rPr lang="en-GB" sz="2400" dirty="0"/>
+              <a:t> </a:t>
+            </a:r>
+            <a:r>
+              <a:rPr lang="en-GB" sz="2400" dirty="0" err="1"/>
+              <a:t>năng</a:t>
+            </a:r>
+            <a:r>
+              <a:rPr lang="en-GB" sz="2400" dirty="0"/>
+              <a:t> </a:t>
+            </a:r>
+            <a:r>
+              <a:rPr lang="en-GB" sz="2400" dirty="0" err="1"/>
+              <a:t>chuyên</a:t>
+            </a:r>
+            <a:r>
+              <a:rPr lang="en-GB" sz="2400" dirty="0"/>
+              <a:t> </a:t>
+            </a:r>
+            <a:r>
+              <a:rPr lang="en-GB" sz="2400" dirty="0" err="1"/>
+              <a:t>nghiệp</a:t>
+            </a:r>
+            <a:r>
+              <a:rPr lang="en-GB" sz="2400" dirty="0"/>
+              <a:t> </a:t>
+            </a:r>
+            <a:r>
+              <a:rPr lang="en-GB" sz="2400" dirty="0" err="1"/>
+              <a:t>để</a:t>
+            </a:r>
+            <a:r>
+              <a:rPr lang="en-GB" sz="2400" dirty="0"/>
+              <a:t> </a:t>
+            </a:r>
+            <a:r>
+              <a:rPr lang="en-GB" sz="2400" dirty="0" err="1"/>
+              <a:t>xây</a:t>
+            </a:r>
+            <a:r>
+              <a:rPr lang="en-GB" sz="2400" dirty="0"/>
+              <a:t> </a:t>
+            </a:r>
+            <a:r>
+              <a:rPr lang="en-GB" sz="2400" dirty="0" err="1"/>
+              <a:t>dựng</a:t>
+            </a:r>
+            <a:r>
+              <a:rPr lang="en-GB" sz="2400" dirty="0"/>
+              <a:t> </a:t>
+            </a:r>
+            <a:r>
+              <a:rPr lang="en-GB" sz="2400" dirty="0" err="1"/>
+              <a:t>thương</a:t>
+            </a:r>
+            <a:r>
+              <a:rPr lang="en-GB" sz="2400" dirty="0"/>
+              <a:t> </a:t>
+            </a:r>
+            <a:r>
+              <a:rPr lang="en-GB" sz="2400" dirty="0" err="1"/>
+              <a:t>hiệu</a:t>
+            </a:r>
+            <a:r>
+              <a:rPr lang="en-GB" sz="2400" dirty="0"/>
+              <a:t> </a:t>
+            </a:r>
+            <a:r>
+              <a:rPr lang="en-GB" sz="2400" dirty="0" err="1"/>
+              <a:t>trên</a:t>
+            </a:r>
+            <a:r>
+              <a:rPr lang="en-GB" sz="2400" dirty="0"/>
+              <a:t> Internet </a:t>
+            </a:r>
+            <a:r>
+              <a:rPr lang="en-GB" sz="2400" dirty="0" err="1"/>
+              <a:t>mà</a:t>
+            </a:r>
+            <a:r>
+              <a:rPr lang="en-GB" sz="2400" dirty="0"/>
+              <a:t> </a:t>
+            </a:r>
+            <a:r>
+              <a:rPr lang="en-GB" sz="2400" b="1" u="sng" dirty="0" err="1">
+                <a:solidFill>
+                  <a:srgbClr val="FF0000"/>
+                </a:solidFill>
+              </a:rPr>
+              <a:t>quản</a:t>
+            </a:r>
+            <a:r>
+              <a:rPr lang="en-GB" sz="2400" b="1" u="sng" dirty="0">
+                <a:solidFill>
+                  <a:srgbClr val="FF0000"/>
+                </a:solidFill>
+              </a:rPr>
+              <a:t> </a:t>
+            </a:r>
+            <a:r>
+              <a:rPr lang="en-GB" sz="2400" b="1" u="sng" dirty="0" err="1">
+                <a:solidFill>
+                  <a:srgbClr val="FF0000"/>
+                </a:solidFill>
+              </a:rPr>
+              <a:t>lý</a:t>
+            </a:r>
+            <a:r>
+              <a:rPr lang="en-GB" sz="2400" b="1" u="sng" dirty="0">
+                <a:solidFill>
+                  <a:srgbClr val="FF0000"/>
+                </a:solidFill>
+              </a:rPr>
+              <a:t> </a:t>
+            </a:r>
+            <a:r>
+              <a:rPr lang="en-GB" sz="2400" b="1" u="sng" dirty="0" err="1">
+                <a:solidFill>
+                  <a:srgbClr val="FF0000"/>
+                </a:solidFill>
+              </a:rPr>
+              <a:t>nó</a:t>
+            </a:r>
+            <a:r>
+              <a:rPr lang="en-GB" sz="2400" b="1" u="sng" dirty="0">
+                <a:solidFill>
+                  <a:srgbClr val="FF0000"/>
+                </a:solidFill>
+              </a:rPr>
+              <a:t> </a:t>
+            </a:r>
+            <a:r>
+              <a:rPr lang="en-GB" sz="2400" b="1" u="sng" dirty="0" err="1">
+                <a:solidFill>
+                  <a:srgbClr val="FF0000"/>
+                </a:solidFill>
+              </a:rPr>
+              <a:t>lại</a:t>
+            </a:r>
+            <a:r>
+              <a:rPr lang="en-GB" sz="2400" b="1" u="sng" dirty="0">
+                <a:solidFill>
+                  <a:srgbClr val="FF0000"/>
+                </a:solidFill>
+              </a:rPr>
+              <a:t> </a:t>
+            </a:r>
+            <a:r>
+              <a:rPr lang="en-GB" sz="2400" b="1" u="sng" dirty="0" err="1">
+                <a:solidFill>
+                  <a:srgbClr val="FF0000"/>
+                </a:solidFill>
+              </a:rPr>
+              <a:t>không</a:t>
+            </a:r>
+            <a:r>
+              <a:rPr lang="en-GB" sz="2400" b="1" u="sng" dirty="0">
+                <a:solidFill>
+                  <a:srgbClr val="FF0000"/>
+                </a:solidFill>
+              </a:rPr>
+              <a:t> </a:t>
+            </a:r>
+            <a:r>
+              <a:rPr lang="en-GB" sz="2400" b="1" u="sng" dirty="0" err="1">
+                <a:solidFill>
+                  <a:srgbClr val="FF0000"/>
+                </a:solidFill>
+              </a:rPr>
+              <a:t>dễ</a:t>
+            </a:r>
+            <a:r>
+              <a:rPr lang="en-GB" sz="2400" b="1" u="sng" dirty="0">
+                <a:solidFill>
+                  <a:srgbClr val="FF0000"/>
+                </a:solidFill>
+              </a:rPr>
+              <a:t> </a:t>
+            </a:r>
+            <a:r>
+              <a:rPr lang="en-GB" sz="2400" b="1" u="sng" dirty="0" err="1">
+                <a:solidFill>
+                  <a:srgbClr val="FF0000"/>
+                </a:solidFill>
+              </a:rPr>
+              <a:t>dàng</a:t>
+            </a:r>
+            <a:endParaRPr lang="en-US" sz="2400" b="1" u="sng" dirty="0">
+              <a:solidFill>
+                <a:srgbClr val="FF0000"/>
+              </a:solidFill>
+            </a:endParaRPr>
+          </a:p>
+        </p:txBody>
+      </p:sp>
+    </p:spTree>
+    <p:extLst>
+      <p:ext uri="{BB962C8B-B14F-4D97-AF65-F5344CB8AC3E}">
+        <p14:creationId xmlns:p14="http://schemas.microsoft.com/office/powerpoint/2010/main" val="4245484655"/>
+      </p:ext>
+    </p:extLst>
+  </p:cSld>
+  <p:clrMapOvr>
+    <a:masterClrMapping/>
+  </p:clrMapOvr>
+  <p:timing>
+    <p:tnLst>
+      <p:par>
+        <p:cTn id="1" dur="indefinite" restart="never" nodeType="tmRoot">
+          <p:childTnLst>
+            <p:seq concurrent="1" nextAc="seek">
+              <p:cTn id="2" dur="indefinite" nodeType="mainSeq">
+                <p:childTnLst>
+                  <p:par>
+                    <p:cTn id="3" fill="hold">
+                      <p:stCondLst>
+                        <p:cond delay="indefinite"/>
+                      </p:stCondLst>
+                      <p:childTnLst>
+                        <p:par>
+                          <p:cTn id="4" fill="hold">
+                            <p:stCondLst>
+                              <p:cond delay="0"/>
+                            </p:stCondLst>
+                            <p:childTnLst>
+                              <p:par>
+                                <p:cTn id="5" presetID="42" presetClass="entr" presetSubtype="0" fill="hold" grpId="0" nodeType="clickEffect">
+                                  <p:stCondLst>
+                                    <p:cond delay="0"/>
+                                  </p:stCondLst>
+                                  <p:childTnLst>
+                                    <p:set>
+                                      <p:cBhvr>
+                                        <p:cTn id="6" dur="1" fill="hold">
+                                          <p:stCondLst>
+                                            <p:cond delay="0"/>
+                                          </p:stCondLst>
+                                        </p:cTn>
+                                        <p:tgtEl>
+                                          <p:spTgt spid="6"/>
+                                        </p:tgtEl>
+                                        <p:attrNameLst>
+                                          <p:attrName>style.visibility</p:attrName>
+                                        </p:attrNameLst>
+                                      </p:cBhvr>
+                                      <p:to>
+                                        <p:strVal val="visible"/>
+                                      </p:to>
+                                    </p:set>
+                                    <p:animEffect transition="in" filter="fade">
+                                      <p:cBhvr>
+                                        <p:cTn id="7" dur="500"/>
+                                        <p:tgtEl>
+                                          <p:spTgt spid="6"/>
+                                        </p:tgtEl>
+                                      </p:cBhvr>
+                                    </p:animEffect>
+                                    <p:anim calcmode="lin" valueType="num">
+                                      <p:cBhvr>
+                                        <p:cTn id="8" dur="500" fill="hold"/>
+                                        <p:tgtEl>
+                                          <p:spTgt spid="6"/>
+                                        </p:tgtEl>
+                                        <p:attrNameLst>
+                                          <p:attrName>ppt_x</p:attrName>
+                                        </p:attrNameLst>
+                                      </p:cBhvr>
+                                      <p:tavLst>
+                                        <p:tav tm="0">
+                                          <p:val>
+                                            <p:strVal val="#ppt_x"/>
+                                          </p:val>
+                                        </p:tav>
+                                        <p:tav tm="100000">
+                                          <p:val>
+                                            <p:strVal val="#ppt_x"/>
+                                          </p:val>
+                                        </p:tav>
+                                      </p:tavLst>
+                                    </p:anim>
+                                    <p:anim calcmode="lin" valueType="num">
+                                      <p:cBhvr>
+                                        <p:cTn id="9" dur="500" fill="hold"/>
+                                        <p:tgtEl>
+                                          <p:spTgt spid="6"/>
+                                        </p:tgtEl>
+                                        <p:attrNameLst>
+                                          <p:attrName>ppt_y</p:attrName>
+                                        </p:attrNameLst>
+                                      </p:cBhvr>
+                                      <p:tavLst>
+                                        <p:tav tm="0">
+                                          <p:val>
+                                            <p:strVal val="#ppt_y+.1"/>
+                                          </p:val>
+                                        </p:tav>
+                                        <p:tav tm="100000">
+                                          <p:val>
+                                            <p:strVal val="#ppt_y"/>
+                                          </p:val>
+                                        </p:tav>
+                                      </p:tavLst>
+                                    </p:anim>
+                                  </p:childTnLst>
+                                </p:cTn>
+                              </p:par>
+                            </p:childTnLst>
+                          </p:cTn>
+                        </p:par>
+                      </p:childTnLst>
+                    </p:cTn>
+                  </p:par>
+                  <p:par>
+                    <p:cTn id="10" fill="hold">
+                      <p:stCondLst>
+                        <p:cond delay="indefinite"/>
+                      </p:stCondLst>
+                      <p:childTnLst>
+                        <p:par>
+                          <p:cTn id="11" fill="hold">
+                            <p:stCondLst>
+                              <p:cond delay="0"/>
+                            </p:stCondLst>
+                            <p:childTnLst>
+                              <p:par>
+                                <p:cTn id="12" presetID="42" presetClass="entr" presetSubtype="0" fill="hold" grpId="0" nodeType="clickEffect">
+                                  <p:stCondLst>
+                                    <p:cond delay="0"/>
+                                  </p:stCondLst>
+                                  <p:childTnLst>
+                                    <p:set>
+                                      <p:cBhvr>
+                                        <p:cTn id="13" dur="1" fill="hold">
+                                          <p:stCondLst>
+                                            <p:cond delay="0"/>
+                                          </p:stCondLst>
+                                        </p:cTn>
+                                        <p:tgtEl>
+                                          <p:spTgt spid="7"/>
+                                        </p:tgtEl>
+                                        <p:attrNameLst>
+                                          <p:attrName>style.visibility</p:attrName>
+                                        </p:attrNameLst>
+                                      </p:cBhvr>
+                                      <p:to>
+                                        <p:strVal val="visible"/>
+                                      </p:to>
+                                    </p:set>
+                                    <p:animEffect transition="in" filter="fade">
+                                      <p:cBhvr>
+                                        <p:cTn id="14" dur="500"/>
+                                        <p:tgtEl>
+                                          <p:spTgt spid="7"/>
+                                        </p:tgtEl>
+                                      </p:cBhvr>
+                                    </p:animEffect>
+                                    <p:anim calcmode="lin" valueType="num">
+                                      <p:cBhvr>
+                                        <p:cTn id="15" dur="500" fill="hold"/>
+                                        <p:tgtEl>
+                                          <p:spTgt spid="7"/>
+                                        </p:tgtEl>
+                                        <p:attrNameLst>
+                                          <p:attrName>ppt_x</p:attrName>
+                                        </p:attrNameLst>
+                                      </p:cBhvr>
+                                      <p:tavLst>
+                                        <p:tav tm="0">
+                                          <p:val>
+                                            <p:strVal val="#ppt_x"/>
+                                          </p:val>
+                                        </p:tav>
+                                        <p:tav tm="100000">
+                                          <p:val>
+                                            <p:strVal val="#ppt_x"/>
+                                          </p:val>
+                                        </p:tav>
+                                      </p:tavLst>
+                                    </p:anim>
+                                    <p:anim calcmode="lin" valueType="num">
+                                      <p:cBhvr>
+                                        <p:cTn id="16" dur="500" fill="hold"/>
+                                        <p:tgtEl>
+                                          <p:spTgt spid="7"/>
+                                        </p:tgtEl>
+                                        <p:attrNameLst>
+                                          <p:attrName>ppt_y</p:attrName>
+                                        </p:attrNameLst>
+                                      </p:cBhvr>
+                                      <p:tavLst>
+                                        <p:tav tm="0">
+                                          <p:val>
+                                            <p:strVal val="#ppt_y+.1"/>
+                                          </p:val>
+                                        </p:tav>
+                                        <p:tav tm="100000">
+                                          <p:val>
+                                            <p:strVal val="#ppt_y"/>
+                                          </p:val>
+                                        </p:tav>
+                                      </p:tavLst>
+                                    </p:anim>
+                                  </p:childTnLst>
+                                </p:cTn>
+                              </p:par>
+                            </p:childTnLst>
+                          </p:cTn>
+                        </p:par>
+                      </p:childTnLst>
+                    </p:cTn>
+                  </p:par>
+                </p:childTnLst>
+              </p:cTn>
+              <p:prevCondLst>
+                <p:cond evt="onPrev" delay="0">
+                  <p:tgtEl>
+                    <p:sldTgt/>
+                  </p:tgtEl>
+                </p:cond>
+              </p:prevCondLst>
+              <p:nextCondLst>
+                <p:cond evt="onNext" delay="0">
+                  <p:tgtEl>
+                    <p:sldTgt/>
+                  </p:tgtEl>
+                </p:cond>
+              </p:nextCondLst>
+            </p:seq>
+          </p:childTnLst>
+        </p:cTn>
+      </p:par>
+    </p:tnLst>
+    <p:bldLst>
+      <p:bldP spid="6" grpId="0"/>
+      <p:bldP spid="7" grpId="0"/>
+    </p:bldLst>
+  </p:timing>
+</p:sld>
+</file>
+
+<file path=ppt/slides/slide4.xml><?xml version="1.0" encoding="utf-8"?>
+<p:sld xmlns:a="http://schemas.openxmlformats.org/drawingml/2006/main" xmlns:r="http://schemas.openxmlformats.org/officeDocument/2006/relationships" xmlns:p="http://schemas.openxmlformats.org/presentationml/2006/main">
+  <p:cSld>
+    <p:spTree>
+      <p:nvGrpSpPr>
+        <p:cNvPr id="1" name=""/>
+        <p:cNvGrpSpPr/>
+        <p:nvPr/>
+      </p:nvGrpSpPr>
+      <p:grpSpPr>
+        <a:xfrm>
+          <a:off x="0" y="0"/>
+          <a:ext cx="0" cy="0"/>
+          <a:chOff x="0" y="0"/>
+          <a:chExt cx="0" cy="0"/>
+        </a:xfrm>
+      </p:grpSpPr>
       <p:sp>
         <p:nvSpPr>
           <p:cNvPr id="6" name="TextBox 5"/>
@@ -5219,7 +6678,7 @@
         </p:nvSpPr>
         <p:spPr>
           <a:xfrm>
-            <a:off x="685800" y="1371600"/>
+            <a:off x="685800" y="838200"/>
             <a:ext cx="8001000" cy="830997"/>
           </a:xfrm>
           <a:prstGeom prst="rect">
@@ -5339,7 +6798,7 @@
         </p:nvSpPr>
         <p:spPr>
           <a:xfrm>
-            <a:off x="685800" y="2017931"/>
+            <a:off x="685800" y="1520104"/>
             <a:ext cx="8153400" cy="1508105"/>
           </a:xfrm>
           <a:prstGeom prst="rect">
@@ -5490,7 +6949,7 @@
         </p:nvSpPr>
         <p:spPr>
           <a:xfrm>
-            <a:off x="685800" y="3005333"/>
+            <a:off x="685800" y="2543668"/>
             <a:ext cx="6858000" cy="461665"/>
           </a:xfrm>
           <a:prstGeom prst="rect">
@@ -5608,7 +7067,7 @@
         </p:nvSpPr>
         <p:spPr>
           <a:xfrm>
-            <a:off x="685800" y="3753356"/>
+            <a:off x="685800" y="3337857"/>
             <a:ext cx="8001000" cy="830997"/>
           </a:xfrm>
           <a:prstGeom prst="rect">
@@ -5726,7 +7185,7 @@
         </p:nvSpPr>
         <p:spPr>
           <a:xfrm>
-            <a:off x="685800" y="4665383"/>
+            <a:off x="685800" y="4992561"/>
             <a:ext cx="7696200" cy="461665"/>
           </a:xfrm>
           <a:prstGeom prst="rect">
@@ -5823,6 +7282,36 @@
             <a:r>
               <a:rPr lang="en-US" sz="2400" dirty="0" smtClean="0"/>
               <a:t>.</a:t>
+            </a:r>
+            <a:endParaRPr lang="en-US" sz="2400" dirty="0"/>
+          </a:p>
+        </p:txBody>
+      </p:sp>
+      <p:sp>
+        <p:nvSpPr>
+          <p:cNvPr id="2" name="TextBox 1"/>
+          <p:cNvSpPr txBox="1"/>
+          <p:nvPr/>
+        </p:nvSpPr>
+        <p:spPr>
+          <a:xfrm>
+            <a:off x="692727" y="4332006"/>
+            <a:ext cx="7162800" cy="461665"/>
+          </a:xfrm>
+          <a:prstGeom prst="rect">
+            <a:avLst/>
+          </a:prstGeom>
+          <a:noFill/>
+        </p:spPr>
+        <p:txBody>
+          <a:bodyPr wrap="square" rtlCol="0">
+            <a:spAutoFit/>
+          </a:bodyPr>
+          <a:lstStyle/>
+          <a:p>
+            <a:r>
+              <a:rPr lang="en-US" sz="2400" dirty="0" smtClean="0"/>
+              <a:t>+ forgot Password</a:t>
             </a:r>
             <a:endParaRPr lang="en-US" sz="2400" dirty="0"/>
           </a:p>
@@ -6018,7 +7507,7 @@
                             </p:stCondLst>
                             <p:childTnLst>
                               <p:par>
-                                <p:cTn id="20" presetID="10" presetClass="entr" presetSubtype="0" fill="hold" grpId="0" nodeType="clickEffect">
+                                <p:cTn id="20" presetID="42" presetClass="entr" presetSubtype="0" fill="hold" grpId="0" nodeType="clickEffect">
                                   <p:stCondLst>
                                     <p:cond delay="0"/>
                                   </p:stCondLst>
@@ -6026,6 +7515,105 @@
                                     <p:set>
                                       <p:cBhvr>
                                         <p:cTn id="21" dur="1" fill="hold">
+                                          <p:stCondLst>
+                                            <p:cond delay="0"/>
+                                          </p:stCondLst>
+                                        </p:cTn>
+                                        <p:tgtEl>
+                                          <p:spTgt spid="2"/>
+                                        </p:tgtEl>
+                                        <p:attrNameLst>
+                                          <p:attrName>style.visibility</p:attrName>
+                                        </p:attrNameLst>
+                                      </p:cBhvr>
+                                      <p:to>
+                                        <p:strVal val="visible"/>
+                                      </p:to>
+                                    </p:set>
+                                    <p:animEffect transition="in" filter="fade">
+                                      <p:cBhvr>
+                                        <p:cTn id="22" dur="500"/>
+                                        <p:tgtEl>
+                                          <p:spTgt spid="2"/>
+                                        </p:tgtEl>
+                                      </p:cBhvr>
+                                    </p:animEffect>
+                                    <p:anim calcmode="lin" valueType="num">
+                                      <p:cBhvr>
+                                        <p:cTn id="23" dur="500" fill="hold"/>
+                                        <p:tgtEl>
+                                          <p:spTgt spid="2"/>
+                                        </p:tgtEl>
+                                        <p:attrNameLst>
+                                          <p:attrName>ppt_x</p:attrName>
+                                        </p:attrNameLst>
+                                      </p:cBhvr>
+                                      <p:tavLst>
+                                        <p:tav tm="0">
+                                          <p:val>
+                                            <p:strVal val="#ppt_x"/>
+                                          </p:val>
+                                        </p:tav>
+                                        <p:tav tm="100000">
+                                          <p:val>
+                                            <p:strVal val="#ppt_x"/>
+                                          </p:val>
+                                        </p:tav>
+                                      </p:tavLst>
+                                    </p:anim>
+                                    <p:anim calcmode="lin" valueType="num">
+                                      <p:cBhvr>
+                                        <p:cTn id="24" dur="500" fill="hold"/>
+                                        <p:tgtEl>
+                                          <p:spTgt spid="2"/>
+                                        </p:tgtEl>
+                                        <p:attrNameLst>
+                                          <p:attrName>ppt_y</p:attrName>
+                                        </p:attrNameLst>
+                                      </p:cBhvr>
+                                      <p:tavLst>
+                                        <p:tav tm="0">
+                                          <p:val>
+                                            <p:strVal val="#ppt_y+.1"/>
+                                          </p:val>
+                                        </p:tav>
+                                        <p:tav tm="100000">
+                                          <p:val>
+                                            <p:strVal val="#ppt_y"/>
+                                          </p:val>
+                                        </p:tav>
+                                      </p:tavLst>
+                                    </p:anim>
+                                  </p:childTnLst>
+                                </p:cTn>
+                              </p:par>
+                            </p:childTnLst>
+                          </p:cTn>
+                        </p:par>
+                      </p:childTnLst>
+                    </p:cTn>
+                  </p:par>
+                  <p:par>
+                    <p:cTn id="25" fill="hold">
+                      <p:stCondLst>
+                        <p:cond delay="indefinite"/>
+                      </p:stCondLst>
+                      <p:childTnLst>
+                        <p:par>
+                          <p:cTn id="26" fill="hold">
+                            <p:stCondLst>
+                              <p:cond delay="0"/>
+                            </p:stCondLst>
+                            <p:childTnLst>
+                              <p:par>
+                                <p:cTn id="27" presetID="10" presetClass="entr" presetSubtype="0" fill="hold" grpId="0" nodeType="clickEffect">
+                                  <p:stCondLst>
+                                    <p:cond delay="0"/>
+                                  </p:stCondLst>
+                                  <p:childTnLst>
+                                    <p:set>
+                                      <p:cBhvr>
+                                        <p:cTn id="28" dur="1" fill="hold">
                                           <p:stCondLst>
                                             <p:cond delay="0"/>
                                           </p:stCondLst>
@@ -6043,7 +7631,7 @@
                                     </p:set>
                                     <p:animEffect transition="in" filter="fade">
                                       <p:cBhvr>
-                                        <p:cTn id="22" dur="250"/>
+                                        <p:cTn id="29" dur="250"/>
                                         <p:tgtEl>
                                           <p:spTgt spid="10"/>
                                         </p:tgtEl>
@@ -6084,12 +7672,13 @@
       <p:bldP spid="8" grpId="0"/>
       <p:bldP spid="9" grpId="0"/>
       <p:bldP spid="10" grpId="0"/>
+      <p:bldP spid="2" grpId="0"/>
     </p:bldLst>
   </p:timing>
 </p:sld>
 </file>
 
-<file path=ppt/slides/slide4.xml><?xml version="1.0" encoding="utf-8"?>
+<file path=ppt/slides/slide5.xml><?xml version="1.0" encoding="utf-8"?>
 <p:sld xmlns:a="http://schemas.openxmlformats.org/drawingml/2006/main" xmlns:r="http://schemas.openxmlformats.org/officeDocument/2006/relationships" xmlns:p="http://schemas.openxmlformats.org/presentationml/2006/main">
   <p:cSld>
     <p:spTree>
@@ -6237,7 +7826,7 @@
 </p:sld>
 </file>
 
-<file path=ppt/slides/slide5.xml><?xml version="1.0" encoding="utf-8"?>
+<file path=ppt/slides/slide6.xml><?xml version="1.0" encoding="utf-8"?>
 <p:sld xmlns:a="http://schemas.openxmlformats.org/drawingml/2006/main" xmlns:r="http://schemas.openxmlformats.org/officeDocument/2006/relationships" xmlns:p="http://schemas.openxmlformats.org/presentationml/2006/main">
   <p:cSld>
     <p:spTree>
@@ -6830,7 +8419,7 @@
 </p:sld>
 </file>
 
-<file path=ppt/slides/slide6.xml><?xml version="1.0" encoding="utf-8"?>
+<file path=ppt/slides/slide7.xml><?xml version="1.0" encoding="utf-8"?>
 <p:sld xmlns:a="http://schemas.openxmlformats.org/drawingml/2006/main" xmlns:r="http://schemas.openxmlformats.org/officeDocument/2006/relationships" xmlns:p="http://schemas.openxmlformats.org/presentationml/2006/main">
   <p:cSld>
     <p:spTree>
@@ -7001,7 +8590,7 @@
 </p:sld>
 </file>
 
-<file path=ppt/slides/slide7.xml><?xml version="1.0" encoding="utf-8"?>
+<file path=ppt/slides/slide8.xml><?xml version="1.0" encoding="utf-8"?>
 <p:sld xmlns:a="http://schemas.openxmlformats.org/drawingml/2006/main" xmlns:r="http://schemas.openxmlformats.org/officeDocument/2006/relationships" xmlns:p="http://schemas.openxmlformats.org/presentationml/2006/main">
   <p:cSld>
     <p:spTree>
@@ -7172,7 +8761,7 @@
 </p:sld>
 </file>
 
-<file path=ppt/slides/slide8.xml><?xml version="1.0" encoding="utf-8"?>
+<file path=ppt/slides/slide9.xml><?xml version="1.0" encoding="utf-8"?>
 <p:sld xmlns:a="http://schemas.openxmlformats.org/drawingml/2006/main" xmlns:r="http://schemas.openxmlformats.org/officeDocument/2006/relationships" xmlns:p="http://schemas.openxmlformats.org/presentationml/2006/main">
   <p:cSld>
     <p:spTree>
@@ -7580,435 +9169,6 @@
 </p:sld>
 </file>
 
-<file path=ppt/slides/slide9.xml><?xml version="1.0" encoding="utf-8"?>
-<p:sld xmlns:a="http://schemas.openxmlformats.org/drawingml/2006/main" xmlns:r="http://schemas.openxmlformats.org/officeDocument/2006/relationships" xmlns:p="http://schemas.openxmlformats.org/presentationml/2006/main">
-  <p:cSld>
-    <p:spTree>
-      <p:nvGrpSpPr>
-        <p:cNvPr id="1" name=""/>
-        <p:cNvGrpSpPr/>
-        <p:nvPr/>
-      </p:nvGrpSpPr>
-      <p:grpSpPr>
-        <a:xfrm>
-          <a:off x="0" y="0"/>
-          <a:ext cx="0" cy="0"/>
-          <a:chOff x="0" y="0"/>
-          <a:chExt cx="0" cy="0"/>
-        </a:xfrm>
-      </p:grpSpPr>
-      <p:pic>
-        <p:nvPicPr>
-          <p:cNvPr id="5122" name="Picture 2"/>
-          <p:cNvPicPr>
-            <a:picLocks noChangeAspect="1" noChangeArrowheads="1"/>
-          </p:cNvPicPr>
-          <p:nvPr/>
-        </p:nvPicPr>
-        <p:blipFill>
-          <a:blip r:embed="rId2">
-            <a:extLst>
-              <a:ext uri="{28A0092B-C50C-407E-A947-70E740481C1C}">
-                <a14:useLocalDpi xmlns:a14="http://schemas.microsoft.com/office/drawing/2010/main" val="0"/>
-              </a:ext>
-            </a:extLst>
-          </a:blip>
-          <a:srcRect/>
-          <a:stretch>
-            <a:fillRect/>
-          </a:stretch>
-        </p:blipFill>
-        <p:spPr bwMode="auto">
-          <a:xfrm>
-            <a:off x="-152400" y="2147454"/>
-            <a:ext cx="9181624" cy="4471987"/>
-          </a:xfrm>
-          <a:prstGeom prst="rect">
-            <a:avLst/>
-          </a:prstGeom>
-          <a:noFill/>
-          <a:ln>
-            <a:noFill/>
-          </a:ln>
-          <a:effectLst/>
-          <a:extLst>
-            <a:ext uri="{909E8E84-426E-40DD-AFC4-6F175D3DCCD1}">
-              <a14:hiddenFill xmlns:a14="http://schemas.microsoft.com/office/drawing/2010/main">
-                <a:solidFill>
-                  <a:schemeClr val="accent1"/>
-                </a:solidFill>
-              </a14:hiddenFill>
-            </a:ext>
-            <a:ext uri="{91240B29-F687-4F45-9708-019B960494DF}">
-              <a14:hiddenLine xmlns:a14="http://schemas.microsoft.com/office/drawing/2010/main" w="9525">
-                <a:solidFill>
-                  <a:schemeClr val="tx1"/>
-                </a:solidFill>
-                <a:miter lim="800000"/>
-                <a:headEnd/>
-                <a:tailEnd/>
-              </a14:hiddenLine>
-            </a:ext>
-            <a:ext uri="{AF507438-7753-43E0-B8FC-AC1667EBCBE1}">
-              <a14:hiddenEffects xmlns:a14="http://schemas.microsoft.com/office/drawing/2010/main">
-                <a:effectLst>
-                  <a:outerShdw dist="35921" dir="2700000" algn="ctr" rotWithShape="0">
-                    <a:schemeClr val="bg2"/>
-                  </a:outerShdw>
-                </a:effectLst>
-              </a14:hiddenEffects>
-            </a:ext>
-          </a:extLst>
-        </p:spPr>
-      </p:pic>
-      <p:pic>
-        <p:nvPicPr>
-          <p:cNvPr id="5123" name="Picture 3"/>
-          <p:cNvPicPr>
-            <a:picLocks noChangeAspect="1" noChangeArrowheads="1"/>
-          </p:cNvPicPr>
-          <p:nvPr/>
-        </p:nvPicPr>
-        <p:blipFill>
-          <a:blip r:embed="rId3">
-            <a:extLst>
-              <a:ext uri="{28A0092B-C50C-407E-A947-70E740481C1C}">
-                <a14:useLocalDpi xmlns:a14="http://schemas.microsoft.com/office/drawing/2010/main" val="0"/>
-              </a:ext>
-            </a:extLst>
-          </a:blip>
-          <a:srcRect/>
-          <a:stretch>
-            <a:fillRect/>
-          </a:stretch>
-        </p:blipFill>
-        <p:spPr bwMode="auto">
-          <a:xfrm>
-            <a:off x="968519" y="1170709"/>
-            <a:ext cx="4486275" cy="990600"/>
-          </a:xfrm>
-          <a:prstGeom prst="rect">
-            <a:avLst/>
-          </a:prstGeom>
-          <a:noFill/>
-          <a:ln>
-            <a:noFill/>
-          </a:ln>
-          <a:effectLst/>
-          <a:extLst>
-            <a:ext uri="{909E8E84-426E-40DD-AFC4-6F175D3DCCD1}">
-              <a14:hiddenFill xmlns:a14="http://schemas.microsoft.com/office/drawing/2010/main">
-                <a:solidFill>
-                  <a:schemeClr val="accent1"/>
-                </a:solidFill>
-              </a14:hiddenFill>
-            </a:ext>
-            <a:ext uri="{91240B29-F687-4F45-9708-019B960494DF}">
-              <a14:hiddenLine xmlns:a14="http://schemas.microsoft.com/office/drawing/2010/main" w="9525">
-                <a:solidFill>
-                  <a:schemeClr val="tx1"/>
-                </a:solidFill>
-                <a:miter lim="800000"/>
-                <a:headEnd/>
-                <a:tailEnd/>
-              </a14:hiddenLine>
-            </a:ext>
-            <a:ext uri="{AF507438-7753-43E0-B8FC-AC1667EBCBE1}">
-              <a14:hiddenEffects xmlns:a14="http://schemas.microsoft.com/office/drawing/2010/main">
-                <a:effectLst>
-                  <a:outerShdw dist="35921" dir="2700000" algn="ctr" rotWithShape="0">
-                    <a:schemeClr val="bg2"/>
-                  </a:outerShdw>
-                </a:effectLst>
-              </a14:hiddenEffects>
-            </a:ext>
-          </a:extLst>
-        </p:spPr>
-      </p:pic>
-      <p:sp>
-        <p:nvSpPr>
-          <p:cNvPr id="4" name="TextBox 3"/>
-          <p:cNvSpPr txBox="1"/>
-          <p:nvPr/>
-        </p:nvSpPr>
-        <p:spPr>
-          <a:xfrm>
-            <a:off x="152400" y="512618"/>
-            <a:ext cx="9601200" cy="461665"/>
-          </a:xfrm>
-          <a:prstGeom prst="rect">
-            <a:avLst/>
-          </a:prstGeom>
-          <a:noFill/>
-        </p:spPr>
-        <p:txBody>
-          <a:bodyPr wrap="square" rtlCol="0">
-            <a:spAutoFit/>
-          </a:bodyPr>
-          <a:lstStyle/>
-          <a:p>
-            <a:r>
-              <a:rPr lang="en-US" sz="2400" dirty="0" err="1" smtClean="0"/>
-              <a:t>Quản</a:t>
-            </a:r>
-            <a:r>
-              <a:rPr lang="en-US" sz="2400" dirty="0" smtClean="0"/>
-              <a:t> </a:t>
-            </a:r>
-            <a:r>
-              <a:rPr lang="en-US" sz="2400" dirty="0" err="1" smtClean="0"/>
-              <a:t>lí</a:t>
-            </a:r>
-            <a:r>
-              <a:rPr lang="en-US" sz="2400" dirty="0" smtClean="0"/>
-              <a:t> </a:t>
-            </a:r>
-            <a:r>
-              <a:rPr lang="en-US" sz="2400" dirty="0" err="1" smtClean="0"/>
-              <a:t>đơn</a:t>
-            </a:r>
-            <a:r>
-              <a:rPr lang="en-US" sz="2400" dirty="0" smtClean="0"/>
-              <a:t> </a:t>
-            </a:r>
-            <a:r>
-              <a:rPr lang="en-US" sz="2400" dirty="0" err="1" smtClean="0"/>
-              <a:t>hàng</a:t>
-            </a:r>
-            <a:r>
-              <a:rPr lang="en-US" sz="2400" dirty="0" smtClean="0"/>
-              <a:t>, </a:t>
-            </a:r>
-            <a:r>
-              <a:rPr lang="en-US" sz="2400" dirty="0" err="1" smtClean="0"/>
-              <a:t>cho</a:t>
-            </a:r>
-            <a:r>
-              <a:rPr lang="en-US" sz="2400" dirty="0" smtClean="0"/>
-              <a:t> </a:t>
-            </a:r>
-            <a:r>
-              <a:rPr lang="en-US" sz="2400" dirty="0" err="1" smtClean="0"/>
-              <a:t>phép</a:t>
-            </a:r>
-            <a:r>
-              <a:rPr lang="en-US" sz="2400" dirty="0" smtClean="0"/>
-              <a:t> </a:t>
-            </a:r>
-            <a:r>
-              <a:rPr lang="en-US" sz="2400" dirty="0" err="1" smtClean="0"/>
-              <a:t>nhập</a:t>
-            </a:r>
-            <a:r>
-              <a:rPr lang="en-US" sz="2400" dirty="0" smtClean="0"/>
-              <a:t> </a:t>
-            </a:r>
-            <a:r>
-              <a:rPr lang="en-US" sz="2400" dirty="0" err="1" smtClean="0"/>
-              <a:t>sản</a:t>
-            </a:r>
-            <a:r>
-              <a:rPr lang="en-US" sz="2400" dirty="0" smtClean="0"/>
-              <a:t> </a:t>
-            </a:r>
-            <a:r>
-              <a:rPr lang="en-US" sz="2400" dirty="0" err="1" smtClean="0"/>
-              <a:t>phẩm</a:t>
-            </a:r>
-            <a:r>
-              <a:rPr lang="en-US" sz="2400" dirty="0" smtClean="0"/>
-              <a:t> </a:t>
-            </a:r>
-            <a:r>
-              <a:rPr lang="en-US" sz="2400" dirty="0" err="1" smtClean="0"/>
-              <a:t>vào</a:t>
-            </a:r>
-            <a:r>
-              <a:rPr lang="en-US" sz="2400" dirty="0" smtClean="0"/>
-              <a:t> </a:t>
-            </a:r>
-            <a:r>
-              <a:rPr lang="en-US" sz="2400" dirty="0" err="1" smtClean="0"/>
-              <a:t>khi</a:t>
-            </a:r>
-            <a:r>
-              <a:rPr lang="en-US" sz="2400" dirty="0" smtClean="0"/>
-              <a:t> </a:t>
-            </a:r>
-            <a:r>
-              <a:rPr lang="en-US" sz="2400" dirty="0" err="1" smtClean="0"/>
-              <a:t>có</a:t>
-            </a:r>
-            <a:r>
-              <a:rPr lang="en-US" sz="2400" dirty="0" smtClean="0"/>
-              <a:t> </a:t>
-            </a:r>
-            <a:r>
-              <a:rPr lang="en-US" sz="2400" dirty="0" err="1" smtClean="0"/>
-              <a:t>sản</a:t>
-            </a:r>
-            <a:r>
-              <a:rPr lang="en-US" sz="2400" dirty="0" smtClean="0"/>
-              <a:t> </a:t>
-            </a:r>
-            <a:r>
-              <a:rPr lang="en-US" sz="2400" dirty="0" err="1" smtClean="0"/>
-              <a:t>phẩm</a:t>
-            </a:r>
-            <a:r>
-              <a:rPr lang="en-US" sz="2400" dirty="0" smtClean="0"/>
-              <a:t> </a:t>
-            </a:r>
-            <a:r>
-              <a:rPr lang="en-US" sz="2400" dirty="0" err="1" smtClean="0"/>
-              <a:t>mới</a:t>
-            </a:r>
-            <a:endParaRPr lang="en-US" sz="2400" dirty="0"/>
-          </a:p>
-        </p:txBody>
-      </p:sp>
-    </p:spTree>
-    <p:extLst>
-      <p:ext uri="{BB962C8B-B14F-4D97-AF65-F5344CB8AC3E}">
-        <p14:creationId xmlns:p14="http://schemas.microsoft.com/office/powerpoint/2010/main" val="2779678098"/>
-      </p:ext>
-    </p:extLst>
-  </p:cSld>
-  <p:clrMapOvr>
-    <a:masterClrMapping/>
-  </p:clrMapOvr>
-  <p:timing>
-    <p:tnLst>
-      <p:par>
-        <p:cTn id="1" dur="indefinite" restart="never" nodeType="tmRoot">
-          <p:childTnLst>
-            <p:seq concurrent="1" nextAc="seek">
-              <p:cTn id="2" dur="indefinite" nodeType="mainSeq">
-                <p:childTnLst>
-                  <p:par>
-                    <p:cTn id="3" fill="hold">
-                      <p:stCondLst>
-                        <p:cond delay="indefinite"/>
-                      </p:stCondLst>
-                      <p:childTnLst>
-                        <p:par>
-                          <p:cTn id="4" fill="hold">
-                            <p:stCondLst>
-                              <p:cond delay="0"/>
-                            </p:stCondLst>
-                            <p:childTnLst>
-                              <p:par>
-                                <p:cTn id="5" presetID="42" presetClass="entr" presetSubtype="0" fill="hold" nodeType="clickEffect">
-                                  <p:stCondLst>
-                                    <p:cond delay="0"/>
-                                  </p:stCondLst>
-                                  <p:childTnLst>
-                                    <p:set>
-                                      <p:cBhvr>
-                                        <p:cTn id="6" dur="1" fill="hold">
-                                          <p:stCondLst>
-                                            <p:cond delay="0"/>
-                                          </p:stCondLst>
-                                        </p:cTn>
-                                        <p:tgtEl>
-                                          <p:spTgt spid="5123"/>
-                                        </p:tgtEl>
-                                        <p:attrNameLst>
-                                          <p:attrName>style.visibility</p:attrName>
-                                        </p:attrNameLst>
-                                      </p:cBhvr>
-                                      <p:to>
-                                        <p:strVal val="visible"/>
-                                      </p:to>
-                                    </p:set>
-                                    <p:animEffect transition="in" filter="fade">
-                                      <p:cBhvr>
-                                        <p:cTn id="7" dur="500"/>
-                                        <p:tgtEl>
-                                          <p:spTgt spid="5123"/>
-                                        </p:tgtEl>
-                                      </p:cBhvr>
-                                    </p:animEffect>
-                                    <p:anim calcmode="lin" valueType="num">
-                                      <p:cBhvr>
-                                        <p:cTn id="8" dur="500" fill="hold"/>
-                                        <p:tgtEl>
-                                          <p:spTgt spid="5123"/>
-                                        </p:tgtEl>
-                                        <p:attrNameLst>
-                                          <p:attrName>ppt_x</p:attrName>
-                                        </p:attrNameLst>
-                                      </p:cBhvr>
-                                      <p:tavLst>
-                                        <p:tav tm="0">
-                                          <p:val>
-                                            <p:strVal val="#ppt_x"/>
-                                          </p:val>
-                                        </p:tav>
-                                        <p:tav tm="100000">
-                                          <p:val>
-                                            <p:strVal val="#ppt_x"/>
-                                          </p:val>
-                                        </p:tav>
-                                      </p:tavLst>
-                                    </p:anim>
-                                    <p:anim calcmode="lin" valueType="num">
-                                      <p:cBhvr>
-                                        <p:cTn id="9" dur="500" fill="hold"/>
-                                        <p:tgtEl>
-                                          <p:spTgt spid="5123"/>
-                                        </p:tgtEl>
-                                        <p:attrNameLst>
-                                          <p:attrName>ppt_y</p:attrName>
-                                        </p:attrNameLst>
-                                      </p:cBhvr>
-                                      <p:tavLst>
-                                        <p:tav tm="0">
-                                          <p:val>
-                                            <p:strVal val="#ppt_y+.1"/>
-                                          </p:val>
-                                        </p:tav>
-                                        <p:tav tm="100000">
-                                          <p:val>
-                                            <p:strVal val="#ppt_y"/>
-                                          </p:val>
-                                        </p:tav>
-                                      </p:tavLst>
-                                    </p:anim>
-                                  </p:childTnLst>
-                                </p:cTn>
-                              </p:par>
-                            </p:childTnLst>
-                          </p:cTn>
-                        </p:par>
-                      </p:childTnLst>
-                    </p:cTn>
-                  </p:par>
-                </p:childTnLst>
-              </p:cTn>
-              <p:prevCondLst>
-                <p:cond evt="onPrev" delay="0">
-                  <p:tgtEl>
-                    <p:sldTgt/>
-                  </p:tgtEl>
-                </p:cond>
-              </p:prevCondLst>
-              <p:nextCondLst>
-                <p:cond evt="onNext" delay="0">
-                  <p:tgtEl>
-                    <p:sldTgt/>
-                  </p:tgtEl>
-                </p:cond>
-              </p:nextCondLst>
-            </p:seq>
-          </p:childTnLst>
-        </p:cTn>
-      </p:par>
-    </p:tnLst>
-  </p:timing>
-</p:sld>
-</file>
-
 <file path=ppt/theme/theme1.xml><?xml version="1.0" encoding="utf-8"?>
 <a:theme xmlns:a="http://schemas.openxmlformats.org/drawingml/2006/main" name="NewsPrint">
   <a:themeElements>

</xml_diff>